<commit_message>
Changed DB design. Added new documentation.
</commit_message>
<xml_diff>
--- a/Check24_Video_Script.pptx
+++ b/Check24_Video_Script.pptx
@@ -20502,7 +20502,7 @@
                   <a:schemeClr val="tx1"/>
                 </a:solidFill>
               </a:rPr>
-              <a:t>Service Layer</a:t>
+              <a:t>   Service Layer</a:t>
             </a:r>
           </a:p>
         </p:txBody>
@@ -22159,7 +22159,7 @@
         </p:blipFill>
         <p:spPr bwMode="auto">
           <a:xfrm>
-            <a:off x="7634826" y="1502112"/>
+            <a:off x="7634826" y="1351800"/>
             <a:ext cx="353878" cy="353878"/>
           </a:xfrm>
           <a:prstGeom prst="rect">
@@ -22206,7 +22206,7 @@
         </p:blipFill>
         <p:spPr bwMode="auto">
           <a:xfrm>
-            <a:off x="7634826" y="3217894"/>
+            <a:off x="7634826" y="3004952"/>
             <a:ext cx="325552" cy="325552"/>
           </a:xfrm>
           <a:prstGeom prst="rect">
@@ -22316,6 +22316,126 @@
               </a14:hiddenFill>
             </a:ext>
           </a:extLst>
+        </p:spPr>
+      </p:pic>
+      <p:pic>
+        <p:nvPicPr>
+          <p:cNvPr id="27" name="Grafik 26">
+            <a:extLst>
+              <a:ext uri="{FF2B5EF4-FFF2-40B4-BE49-F238E27FC236}">
+                <a16:creationId xmlns:a16="http://schemas.microsoft.com/office/drawing/2014/main" id="{9788B3D5-EF9F-7156-AD0D-7D7DB1DCFD17}"/>
+              </a:ext>
+            </a:extLst>
+          </p:cNvPr>
+          <p:cNvPicPr>
+            <a:picLocks noChangeAspect="1"/>
+          </p:cNvPicPr>
+          <p:nvPr/>
+        </p:nvPicPr>
+        <p:blipFill>
+          <a:blip r:embed="rId12"/>
+          <a:stretch>
+            <a:fillRect/>
+          </a:stretch>
+        </p:blipFill>
+        <p:spPr>
+          <a:xfrm>
+            <a:off x="4041016" y="787601"/>
+            <a:ext cx="534134" cy="404025"/>
+          </a:xfrm>
+          <a:prstGeom prst="rect">
+            <a:avLst/>
+          </a:prstGeom>
+        </p:spPr>
+      </p:pic>
+      <p:pic>
+        <p:nvPicPr>
+          <p:cNvPr id="28" name="Grafik 27">
+            <a:extLst>
+              <a:ext uri="{FF2B5EF4-FFF2-40B4-BE49-F238E27FC236}">
+                <a16:creationId xmlns:a16="http://schemas.microsoft.com/office/drawing/2014/main" id="{16BFF912-BC50-4733-F9FC-0E2B4E110869}"/>
+              </a:ext>
+            </a:extLst>
+          </p:cNvPr>
+          <p:cNvPicPr>
+            <a:picLocks noChangeAspect="1"/>
+          </p:cNvPicPr>
+          <p:nvPr/>
+        </p:nvPicPr>
+        <p:blipFill>
+          <a:blip r:embed="rId12"/>
+          <a:stretch>
+            <a:fillRect/>
+          </a:stretch>
+        </p:blipFill>
+        <p:spPr>
+          <a:xfrm>
+            <a:off x="1751011" y="4018619"/>
+            <a:ext cx="534134" cy="404025"/>
+          </a:xfrm>
+          <a:prstGeom prst="rect">
+            <a:avLst/>
+          </a:prstGeom>
+        </p:spPr>
+      </p:pic>
+      <p:pic>
+        <p:nvPicPr>
+          <p:cNvPr id="29" name="Grafik 28">
+            <a:extLst>
+              <a:ext uri="{FF2B5EF4-FFF2-40B4-BE49-F238E27FC236}">
+                <a16:creationId xmlns:a16="http://schemas.microsoft.com/office/drawing/2014/main" id="{9980CC8A-5A61-3065-069C-254D5BEADCF4}"/>
+              </a:ext>
+            </a:extLst>
+          </p:cNvPr>
+          <p:cNvPicPr>
+            <a:picLocks noChangeAspect="1"/>
+          </p:cNvPicPr>
+          <p:nvPr/>
+        </p:nvPicPr>
+        <p:blipFill>
+          <a:blip r:embed="rId12"/>
+          <a:stretch>
+            <a:fillRect/>
+          </a:stretch>
+        </p:blipFill>
+        <p:spPr>
+          <a:xfrm>
+            <a:off x="4041016" y="3593617"/>
+            <a:ext cx="534134" cy="404025"/>
+          </a:xfrm>
+          <a:prstGeom prst="rect">
+            <a:avLst/>
+          </a:prstGeom>
+        </p:spPr>
+      </p:pic>
+      <p:pic>
+        <p:nvPicPr>
+          <p:cNvPr id="30" name="Grafik 29">
+            <a:extLst>
+              <a:ext uri="{FF2B5EF4-FFF2-40B4-BE49-F238E27FC236}">
+                <a16:creationId xmlns:a16="http://schemas.microsoft.com/office/drawing/2014/main" id="{7E290431-05DC-FAF9-A32B-C477E2EC6C6F}"/>
+              </a:ext>
+            </a:extLst>
+          </p:cNvPr>
+          <p:cNvPicPr>
+            <a:picLocks noChangeAspect="1"/>
+          </p:cNvPicPr>
+          <p:nvPr/>
+        </p:nvPicPr>
+        <p:blipFill>
+          <a:blip r:embed="rId12"/>
+          <a:stretch>
+            <a:fillRect/>
+          </a:stretch>
+        </p:blipFill>
+        <p:spPr>
+          <a:xfrm>
+            <a:off x="4041016" y="4738388"/>
+            <a:ext cx="534134" cy="404025"/>
+          </a:xfrm>
+          <a:prstGeom prst="rect">
+            <a:avLst/>
+          </a:prstGeom>
         </p:spPr>
       </p:pic>
     </p:spTree>

</xml_diff>